<commit_message>
actualizacion de la guia positiva
</commit_message>
<xml_diff>
--- a/projects/RiskAnalyzers_project/presentation/riskanalyzers_presentacion.pptx
+++ b/projects/RiskAnalyzers_project/presentation/riskanalyzers_presentacion.pptx
@@ -8,19 +8,14 @@
     <p:sldId id="256" r:id="rId2"/>
     <p:sldId id="257" r:id="rId3"/>
     <p:sldId id="258" r:id="rId4"/>
-    <p:sldId id="260" r:id="rId5"/>
-    <p:sldId id="259" r:id="rId6"/>
-    <p:sldId id="261" r:id="rId7"/>
-    <p:sldId id="262" r:id="rId8"/>
-    <p:sldId id="263" r:id="rId9"/>
-    <p:sldId id="264" r:id="rId10"/>
-    <p:sldId id="265" r:id="rId11"/>
-    <p:sldId id="266" r:id="rId12"/>
-    <p:sldId id="267" r:id="rId13"/>
-    <p:sldId id="268" r:id="rId14"/>
-    <p:sldId id="269" r:id="rId15"/>
-    <p:sldId id="270" r:id="rId16"/>
-    <p:sldId id="271" r:id="rId17"/>
+    <p:sldId id="259" r:id="rId5"/>
+    <p:sldId id="260" r:id="rId6"/>
+    <p:sldId id="266" r:id="rId7"/>
+    <p:sldId id="267" r:id="rId8"/>
+    <p:sldId id="268" r:id="rId9"/>
+    <p:sldId id="269" r:id="rId10"/>
+    <p:sldId id="270" r:id="rId11"/>
+    <p:sldId id="271" r:id="rId12"/>
   </p:sldIdLst>
   <p:sldSz cx="12192000" cy="6858000"/>
   <p:notesSz cx="6858000" cy="9144000"/>
@@ -119,6 +114,11 @@
       </a:defRPr>
     </a:lvl9pPr>
   </p:defaultTextStyle>
+  <p:extLst>
+    <p:ext uri="{EFAFB233-063F-42B5-8137-9DF3F51BA10A}">
+      <p15:sldGuideLst xmlns:p15="http://schemas.microsoft.com/office/powerpoint/2012/main"/>
+    </p:ext>
+  </p:extLst>
 </p:presentation>
 </file>
 
@@ -844,7 +844,7 @@
           <a:p>
             <a:fld id="{2B79047B-1D06-4F85-8057-9D257DC55B57}" type="datetimeFigureOut">
               <a:rPr lang="es-CO" smtClean="0"/>
-              <a:t>13/06/2024</a:t>
+              <a:t>21/06/2024</a:t>
             </a:fld>
             <a:endParaRPr lang="es-CO"/>
           </a:p>
@@ -1095,7 +1095,7 @@
           <a:p>
             <a:fld id="{2B79047B-1D06-4F85-8057-9D257DC55B57}" type="datetimeFigureOut">
               <a:rPr lang="es-CO" smtClean="0"/>
-              <a:t>13/06/2024</a:t>
+              <a:t>21/06/2024</a:t>
             </a:fld>
             <a:endParaRPr lang="es-CO"/>
           </a:p>
@@ -1409,7 +1409,7 @@
           <a:p>
             <a:fld id="{2B79047B-1D06-4F85-8057-9D257DC55B57}" type="datetimeFigureOut">
               <a:rPr lang="es-CO" smtClean="0"/>
-              <a:t>13/06/2024</a:t>
+              <a:t>21/06/2024</a:t>
             </a:fld>
             <a:endParaRPr lang="es-CO"/>
           </a:p>
@@ -1750,7 +1750,7 @@
           <a:p>
             <a:fld id="{2B79047B-1D06-4F85-8057-9D257DC55B57}" type="datetimeFigureOut">
               <a:rPr lang="es-CO" smtClean="0"/>
-              <a:t>13/06/2024</a:t>
+              <a:t>21/06/2024</a:t>
             </a:fld>
             <a:endParaRPr lang="es-CO"/>
           </a:p>
@@ -2064,7 +2064,7 @@
           <a:p>
             <a:fld id="{2B79047B-1D06-4F85-8057-9D257DC55B57}" type="datetimeFigureOut">
               <a:rPr lang="es-CO" smtClean="0"/>
-              <a:t>13/06/2024</a:t>
+              <a:t>21/06/2024</a:t>
             </a:fld>
             <a:endParaRPr lang="es-CO"/>
           </a:p>
@@ -2457,7 +2457,7 @@
           <a:p>
             <a:fld id="{2B79047B-1D06-4F85-8057-9D257DC55B57}" type="datetimeFigureOut">
               <a:rPr lang="es-CO" smtClean="0"/>
-              <a:t>13/06/2024</a:t>
+              <a:t>21/06/2024</a:t>
             </a:fld>
             <a:endParaRPr lang="es-CO"/>
           </a:p>
@@ -2627,7 +2627,7 @@
           <a:p>
             <a:fld id="{2B79047B-1D06-4F85-8057-9D257DC55B57}" type="datetimeFigureOut">
               <a:rPr lang="es-CO" smtClean="0"/>
-              <a:t>13/06/2024</a:t>
+              <a:t>21/06/2024</a:t>
             </a:fld>
             <a:endParaRPr lang="es-CO"/>
           </a:p>
@@ -2807,7 +2807,7 @@
           <a:p>
             <a:fld id="{2B79047B-1D06-4F85-8057-9D257DC55B57}" type="datetimeFigureOut">
               <a:rPr lang="es-CO" smtClean="0"/>
-              <a:t>13/06/2024</a:t>
+              <a:t>21/06/2024</a:t>
             </a:fld>
             <a:endParaRPr lang="es-CO"/>
           </a:p>
@@ -2983,7 +2983,7 @@
           <a:p>
             <a:fld id="{2B79047B-1D06-4F85-8057-9D257DC55B57}" type="datetimeFigureOut">
               <a:rPr lang="es-CO" smtClean="0"/>
-              <a:t>13/06/2024</a:t>
+              <a:t>21/06/2024</a:t>
             </a:fld>
             <a:endParaRPr lang="es-CO"/>
           </a:p>
@@ -3230,7 +3230,7 @@
           <a:p>
             <a:fld id="{2B79047B-1D06-4F85-8057-9D257DC55B57}" type="datetimeFigureOut">
               <a:rPr lang="es-CO" smtClean="0"/>
-              <a:t>13/06/2024</a:t>
+              <a:t>21/06/2024</a:t>
             </a:fld>
             <a:endParaRPr lang="es-CO"/>
           </a:p>
@@ -3462,7 +3462,7 @@
           <a:p>
             <a:fld id="{2B79047B-1D06-4F85-8057-9D257DC55B57}" type="datetimeFigureOut">
               <a:rPr lang="es-CO" smtClean="0"/>
-              <a:t>13/06/2024</a:t>
+              <a:t>21/06/2024</a:t>
             </a:fld>
             <a:endParaRPr lang="es-CO"/>
           </a:p>
@@ -3836,7 +3836,7 @@
           <a:p>
             <a:fld id="{2B79047B-1D06-4F85-8057-9D257DC55B57}" type="datetimeFigureOut">
               <a:rPr lang="es-CO" smtClean="0"/>
-              <a:t>13/06/2024</a:t>
+              <a:t>21/06/2024</a:t>
             </a:fld>
             <a:endParaRPr lang="es-CO"/>
           </a:p>
@@ -3959,7 +3959,7 @@
           <a:p>
             <a:fld id="{2B79047B-1D06-4F85-8057-9D257DC55B57}" type="datetimeFigureOut">
               <a:rPr lang="es-CO" smtClean="0"/>
-              <a:t>13/06/2024</a:t>
+              <a:t>21/06/2024</a:t>
             </a:fld>
             <a:endParaRPr lang="es-CO"/>
           </a:p>
@@ -4054,7 +4054,7 @@
           <a:p>
             <a:fld id="{2B79047B-1D06-4F85-8057-9D257DC55B57}" type="datetimeFigureOut">
               <a:rPr lang="es-CO" smtClean="0"/>
-              <a:t>13/06/2024</a:t>
+              <a:t>21/06/2024</a:t>
             </a:fld>
             <a:endParaRPr lang="es-CO"/>
           </a:p>
@@ -4309,7 +4309,7 @@
           <a:p>
             <a:fld id="{2B79047B-1D06-4F85-8057-9D257DC55B57}" type="datetimeFigureOut">
               <a:rPr lang="es-CO" smtClean="0"/>
-              <a:t>13/06/2024</a:t>
+              <a:t>21/06/2024</a:t>
             </a:fld>
             <a:endParaRPr lang="es-CO"/>
           </a:p>
@@ -4572,7 +4572,7 @@
           <a:p>
             <a:fld id="{2B79047B-1D06-4F85-8057-9D257DC55B57}" type="datetimeFigureOut">
               <a:rPr lang="es-CO" smtClean="0"/>
-              <a:t>13/06/2024</a:t>
+              <a:t>21/06/2024</a:t>
             </a:fld>
             <a:endParaRPr lang="es-CO"/>
           </a:p>
@@ -5315,7 +5315,7 @@
           <a:p>
             <a:fld id="{2B79047B-1D06-4F85-8057-9D257DC55B57}" type="datetimeFigureOut">
               <a:rPr lang="es-CO" smtClean="0"/>
-              <a:t>13/06/2024</a:t>
+              <a:t>21/06/2024</a:t>
             </a:fld>
             <a:endParaRPr lang="es-CO"/>
           </a:p>
@@ -6106,741 +6106,6 @@
           <a:p>
             <a:r>
               <a:rPr lang="es-ES" b="1" dirty="0"/>
-              <a:t>Transformación de Variables utilizando WOE</a:t>
-            </a:r>
-            <a:endParaRPr lang="es-CO" b="1" dirty="0"/>
-          </a:p>
-        </p:txBody>
-      </p:sp>
-      <p:sp>
-        <p:nvSpPr>
-          <p:cNvPr id="3" name="Marcador de contenido 2">
-            <a:extLst>
-              <a:ext uri="{FF2B5EF4-FFF2-40B4-BE49-F238E27FC236}">
-                <a16:creationId xmlns:a16="http://schemas.microsoft.com/office/drawing/2014/main" id="{5AD9F4B8-2E53-5861-48C8-A2CC06ECD4B6}"/>
-              </a:ext>
-            </a:extLst>
-          </p:cNvPr>
-          <p:cNvSpPr>
-            <a:spLocks noGrp="1"/>
-          </p:cNvSpPr>
-          <p:nvPr>
-            <p:ph idx="1"/>
-          </p:nvPr>
-        </p:nvSpPr>
-        <p:spPr/>
-        <p:txBody>
-          <a:bodyPr>
-            <a:normAutofit/>
-          </a:bodyPr>
-          <a:lstStyle/>
-          <a:p>
-            <a:pPr algn="just"/>
-            <a:r>
-              <a:rPr lang="es-ES" sz="2200" dirty="0"/>
-              <a:t>Para transformar las variables del </a:t>
-            </a:r>
-            <a:r>
-              <a:rPr lang="es-ES" sz="2200" dirty="0" err="1"/>
-              <a:t>DataFrame</a:t>
-            </a:r>
-            <a:r>
-              <a:rPr lang="es-ES" sz="2200" dirty="0"/>
-              <a:t> </a:t>
-            </a:r>
-            <a:r>
-              <a:rPr lang="es-ES" sz="2200" dirty="0" err="1"/>
-              <a:t>df</a:t>
-            </a:r>
-            <a:r>
-              <a:rPr lang="es-ES" sz="2200" dirty="0"/>
-              <a:t> utilizando el </a:t>
-            </a:r>
-            <a:r>
-              <a:rPr lang="es-ES" sz="2200" dirty="0" err="1"/>
-              <a:t>Weight</a:t>
-            </a:r>
-            <a:r>
-              <a:rPr lang="es-ES" sz="2200" dirty="0"/>
-              <a:t> </a:t>
-            </a:r>
-            <a:r>
-              <a:rPr lang="es-ES" sz="2200" dirty="0" err="1"/>
-              <a:t>of</a:t>
-            </a:r>
-            <a:r>
-              <a:rPr lang="es-ES" sz="2200" dirty="0"/>
-              <a:t> </a:t>
-            </a:r>
-            <a:r>
-              <a:rPr lang="es-ES" sz="2200" dirty="0" err="1"/>
-              <a:t>Evidence</a:t>
-            </a:r>
-            <a:r>
-              <a:rPr lang="es-ES" sz="2200" dirty="0"/>
-              <a:t> (WOE) previamente calculado, utilizamos la función </a:t>
-            </a:r>
-            <a:r>
-              <a:rPr lang="es-ES" sz="2200" dirty="0" err="1"/>
-              <a:t>woebin_ply</a:t>
-            </a:r>
-            <a:r>
-              <a:rPr lang="es-ES" sz="2200" dirty="0"/>
-              <a:t> de la biblioteca </a:t>
-            </a:r>
-            <a:r>
-              <a:rPr lang="es-ES" sz="2200" dirty="0" err="1"/>
-              <a:t>scorecardpy</a:t>
-            </a:r>
-            <a:r>
-              <a:rPr lang="es-ES" sz="2200" dirty="0"/>
-              <a:t>.</a:t>
-            </a:r>
-            <a:endParaRPr lang="es-CO" sz="2200" dirty="0"/>
-          </a:p>
-        </p:txBody>
-      </p:sp>
-    </p:spTree>
-    <p:extLst>
-      <p:ext uri="{BB962C8B-B14F-4D97-AF65-F5344CB8AC3E}">
-        <p14:creationId xmlns:p14="http://schemas.microsoft.com/office/powerpoint/2010/main" val="3982638949"/>
-      </p:ext>
-    </p:extLst>
-  </p:cSld>
-  <p:clrMapOvr>
-    <a:masterClrMapping/>
-  </p:clrMapOvr>
-</p:sld>
-</file>
-
-<file path=ppt/slides/slide11.xml><?xml version="1.0" encoding="utf-8"?>
-<p:sld xmlns:a="http://schemas.openxmlformats.org/drawingml/2006/main" xmlns:r="http://schemas.openxmlformats.org/officeDocument/2006/relationships" xmlns:p="http://schemas.openxmlformats.org/presentationml/2006/main">
-  <p:cSld>
-    <p:spTree>
-      <p:nvGrpSpPr>
-        <p:cNvPr id="1" name=""/>
-        <p:cNvGrpSpPr/>
-        <p:nvPr/>
-      </p:nvGrpSpPr>
-      <p:grpSpPr>
-        <a:xfrm>
-          <a:off x="0" y="0"/>
-          <a:ext cx="0" cy="0"/>
-          <a:chOff x="0" y="0"/>
-          <a:chExt cx="0" cy="0"/>
-        </a:xfrm>
-      </p:grpSpPr>
-      <p:sp>
-        <p:nvSpPr>
-          <p:cNvPr id="2" name="Título 1">
-            <a:extLst>
-              <a:ext uri="{FF2B5EF4-FFF2-40B4-BE49-F238E27FC236}">
-                <a16:creationId xmlns:a16="http://schemas.microsoft.com/office/drawing/2014/main" id="{5DF17863-60E5-B3E7-A5DE-2F5FDAF7AFCE}"/>
-              </a:ext>
-            </a:extLst>
-          </p:cNvPr>
-          <p:cNvSpPr>
-            <a:spLocks noGrp="1"/>
-          </p:cNvSpPr>
-          <p:nvPr>
-            <p:ph type="title"/>
-          </p:nvPr>
-        </p:nvSpPr>
-        <p:spPr/>
-        <p:txBody>
-          <a:bodyPr/>
-          <a:lstStyle/>
-          <a:p>
-            <a:r>
-              <a:rPr lang="es-ES" b="1" dirty="0"/>
-              <a:t>División de los Datos en Entrenamiento y Prueba</a:t>
-            </a:r>
-            <a:endParaRPr lang="es-CO" b="1" dirty="0"/>
-          </a:p>
-        </p:txBody>
-      </p:sp>
-      <p:sp>
-        <p:nvSpPr>
-          <p:cNvPr id="3" name="Marcador de contenido 2">
-            <a:extLst>
-              <a:ext uri="{FF2B5EF4-FFF2-40B4-BE49-F238E27FC236}">
-                <a16:creationId xmlns:a16="http://schemas.microsoft.com/office/drawing/2014/main" id="{5AD9F4B8-2E53-5861-48C8-A2CC06ECD4B6}"/>
-              </a:ext>
-            </a:extLst>
-          </p:cNvPr>
-          <p:cNvSpPr>
-            <a:spLocks noGrp="1"/>
-          </p:cNvSpPr>
-          <p:nvPr>
-            <p:ph idx="1"/>
-          </p:nvPr>
-        </p:nvSpPr>
-        <p:spPr/>
-        <p:txBody>
-          <a:bodyPr>
-            <a:normAutofit/>
-          </a:bodyPr>
-          <a:lstStyle/>
-          <a:p>
-            <a:pPr algn="just"/>
-            <a:r>
-              <a:rPr lang="es-ES" sz="2200" dirty="0"/>
-              <a:t>Después de transformar las variables utilizando </a:t>
-            </a:r>
-            <a:r>
-              <a:rPr lang="es-ES" sz="2200" dirty="0" err="1"/>
-              <a:t>Weight</a:t>
-            </a:r>
-            <a:r>
-              <a:rPr lang="es-ES" sz="2200" dirty="0"/>
-              <a:t> </a:t>
-            </a:r>
-            <a:r>
-              <a:rPr lang="es-ES" sz="2200" dirty="0" err="1"/>
-              <a:t>of</a:t>
-            </a:r>
-            <a:r>
-              <a:rPr lang="es-ES" sz="2200" dirty="0"/>
-              <a:t> </a:t>
-            </a:r>
-            <a:r>
-              <a:rPr lang="es-ES" sz="2200" dirty="0" err="1"/>
-              <a:t>Evidence</a:t>
-            </a:r>
-            <a:r>
-              <a:rPr lang="es-ES" sz="2200" dirty="0"/>
-              <a:t> (WOE), procedemos a dividir los datos en conjuntos de entrenamiento y prueba. Esto nos permitirá entrenar nuestro modelo en el conjunto de entrenamiento y evaluar su rendimiento en el conjunto de prueba.</a:t>
-            </a:r>
-            <a:endParaRPr lang="es-CO" sz="2200" dirty="0"/>
-          </a:p>
-        </p:txBody>
-      </p:sp>
-      <p:pic>
-        <p:nvPicPr>
-          <p:cNvPr id="5122" name="Picture 2" descr="Qué es el escenario de entrenamiento, validación y prueba de conjuntos de  datos en aprendizaje automático? - Quora">
-            <a:extLst>
-              <a:ext uri="{FF2B5EF4-FFF2-40B4-BE49-F238E27FC236}">
-                <a16:creationId xmlns:a16="http://schemas.microsoft.com/office/drawing/2014/main" id="{911D76D3-7560-600A-119A-3B5FA23500E1}"/>
-              </a:ext>
-            </a:extLst>
-          </p:cNvPr>
-          <p:cNvPicPr>
-            <a:picLocks noChangeAspect="1" noChangeArrowheads="1"/>
-          </p:cNvPicPr>
-          <p:nvPr/>
-        </p:nvPicPr>
-        <p:blipFill>
-          <a:blip r:embed="rId2">
-            <a:extLst>
-              <a:ext uri="{28A0092B-C50C-407E-A947-70E740481C1C}">
-                <a14:useLocalDpi xmlns:a14="http://schemas.microsoft.com/office/drawing/2010/main" val="0"/>
-              </a:ext>
-            </a:extLst>
-          </a:blip>
-          <a:srcRect/>
-          <a:stretch>
-            <a:fillRect/>
-          </a:stretch>
-        </p:blipFill>
-        <p:spPr bwMode="auto">
-          <a:xfrm>
-            <a:off x="2284855" y="4211087"/>
-            <a:ext cx="5381625" cy="2419350"/>
-          </a:xfrm>
-          <a:prstGeom prst="rect">
-            <a:avLst/>
-          </a:prstGeom>
-          <a:noFill/>
-          <a:extLst>
-            <a:ext uri="{909E8E84-426E-40DD-AFC4-6F175D3DCCD1}">
-              <a14:hiddenFill xmlns:a14="http://schemas.microsoft.com/office/drawing/2010/main">
-                <a:solidFill>
-                  <a:srgbClr val="FFFFFF"/>
-                </a:solidFill>
-              </a14:hiddenFill>
-            </a:ext>
-          </a:extLst>
-        </p:spPr>
-      </p:pic>
-    </p:spTree>
-    <p:extLst>
-      <p:ext uri="{BB962C8B-B14F-4D97-AF65-F5344CB8AC3E}">
-        <p14:creationId xmlns:p14="http://schemas.microsoft.com/office/powerpoint/2010/main" val="3816782697"/>
-      </p:ext>
-    </p:extLst>
-  </p:cSld>
-  <p:clrMapOvr>
-    <a:masterClrMapping/>
-  </p:clrMapOvr>
-</p:sld>
-</file>
-
-<file path=ppt/slides/slide12.xml><?xml version="1.0" encoding="utf-8"?>
-<p:sld xmlns:a="http://schemas.openxmlformats.org/drawingml/2006/main" xmlns:r="http://schemas.openxmlformats.org/officeDocument/2006/relationships" xmlns:p="http://schemas.openxmlformats.org/presentationml/2006/main">
-  <p:cSld>
-    <p:spTree>
-      <p:nvGrpSpPr>
-        <p:cNvPr id="1" name=""/>
-        <p:cNvGrpSpPr/>
-        <p:nvPr/>
-      </p:nvGrpSpPr>
-      <p:grpSpPr>
-        <a:xfrm>
-          <a:off x="0" y="0"/>
-          <a:ext cx="0" cy="0"/>
-          <a:chOff x="0" y="0"/>
-          <a:chExt cx="0" cy="0"/>
-        </a:xfrm>
-      </p:grpSpPr>
-      <p:sp>
-        <p:nvSpPr>
-          <p:cNvPr id="2" name="Título 1">
-            <a:extLst>
-              <a:ext uri="{FF2B5EF4-FFF2-40B4-BE49-F238E27FC236}">
-                <a16:creationId xmlns:a16="http://schemas.microsoft.com/office/drawing/2014/main" id="{5DF17863-60E5-B3E7-A5DE-2F5FDAF7AFCE}"/>
-              </a:ext>
-            </a:extLst>
-          </p:cNvPr>
-          <p:cNvSpPr>
-            <a:spLocks noGrp="1"/>
-          </p:cNvSpPr>
-          <p:nvPr>
-            <p:ph type="title"/>
-          </p:nvPr>
-        </p:nvSpPr>
-        <p:spPr/>
-        <p:txBody>
-          <a:bodyPr/>
-          <a:lstStyle/>
-          <a:p>
-            <a:r>
-              <a:rPr lang="es-ES" b="1" dirty="0"/>
-              <a:t>Configuración y Uso de </a:t>
-            </a:r>
-            <a:r>
-              <a:rPr lang="es-ES" b="1" dirty="0" err="1"/>
-              <a:t>MLflow</a:t>
-            </a:r>
-            <a:endParaRPr lang="es-CO" b="1" dirty="0"/>
-          </a:p>
-        </p:txBody>
-      </p:sp>
-      <p:pic>
-        <p:nvPicPr>
-          <p:cNvPr id="6146" name="Picture 2" descr="MLflow - tutorial para gestionar tu modelo">
-            <a:extLst>
-              <a:ext uri="{FF2B5EF4-FFF2-40B4-BE49-F238E27FC236}">
-                <a16:creationId xmlns:a16="http://schemas.microsoft.com/office/drawing/2014/main" id="{01F0B848-5442-8BFF-33C7-1EE5138B3A00}"/>
-              </a:ext>
-            </a:extLst>
-          </p:cNvPr>
-          <p:cNvPicPr>
-            <a:picLocks noChangeAspect="1" noChangeArrowheads="1"/>
-          </p:cNvPicPr>
-          <p:nvPr/>
-        </p:nvPicPr>
-        <p:blipFill>
-          <a:blip r:embed="rId2">
-            <a:extLst>
-              <a:ext uri="{28A0092B-C50C-407E-A947-70E740481C1C}">
-                <a14:useLocalDpi xmlns:a14="http://schemas.microsoft.com/office/drawing/2010/main" val="0"/>
-              </a:ext>
-            </a:extLst>
-          </a:blip>
-          <a:srcRect/>
-          <a:stretch>
-            <a:fillRect/>
-          </a:stretch>
-        </p:blipFill>
-        <p:spPr bwMode="auto">
-          <a:xfrm>
-            <a:off x="963977" y="1735247"/>
-            <a:ext cx="8023382" cy="4513153"/>
-          </a:xfrm>
-          <a:prstGeom prst="rect">
-            <a:avLst/>
-          </a:prstGeom>
-          <a:noFill/>
-          <a:extLst>
-            <a:ext uri="{909E8E84-426E-40DD-AFC4-6F175D3DCCD1}">
-              <a14:hiddenFill xmlns:a14="http://schemas.microsoft.com/office/drawing/2010/main">
-                <a:solidFill>
-                  <a:srgbClr val="FFFFFF"/>
-                </a:solidFill>
-              </a14:hiddenFill>
-            </a:ext>
-          </a:extLst>
-        </p:spPr>
-      </p:pic>
-    </p:spTree>
-    <p:extLst>
-      <p:ext uri="{BB962C8B-B14F-4D97-AF65-F5344CB8AC3E}">
-        <p14:creationId xmlns:p14="http://schemas.microsoft.com/office/powerpoint/2010/main" val="1979805940"/>
-      </p:ext>
-    </p:extLst>
-  </p:cSld>
-  <p:clrMapOvr>
-    <a:masterClrMapping/>
-  </p:clrMapOvr>
-</p:sld>
-</file>
-
-<file path=ppt/slides/slide13.xml><?xml version="1.0" encoding="utf-8"?>
-<p:sld xmlns:a="http://schemas.openxmlformats.org/drawingml/2006/main" xmlns:r="http://schemas.openxmlformats.org/officeDocument/2006/relationships" xmlns:p="http://schemas.openxmlformats.org/presentationml/2006/main">
-  <p:cSld>
-    <p:spTree>
-      <p:nvGrpSpPr>
-        <p:cNvPr id="1" name=""/>
-        <p:cNvGrpSpPr/>
-        <p:nvPr/>
-      </p:nvGrpSpPr>
-      <p:grpSpPr>
-        <a:xfrm>
-          <a:off x="0" y="0"/>
-          <a:ext cx="0" cy="0"/>
-          <a:chOff x="0" y="0"/>
-          <a:chExt cx="0" cy="0"/>
-        </a:xfrm>
-      </p:grpSpPr>
-      <p:sp>
-        <p:nvSpPr>
-          <p:cNvPr id="2" name="Título 1">
-            <a:extLst>
-              <a:ext uri="{FF2B5EF4-FFF2-40B4-BE49-F238E27FC236}">
-                <a16:creationId xmlns:a16="http://schemas.microsoft.com/office/drawing/2014/main" id="{5DF17863-60E5-B3E7-A5DE-2F5FDAF7AFCE}"/>
-              </a:ext>
-            </a:extLst>
-          </p:cNvPr>
-          <p:cNvSpPr>
-            <a:spLocks noGrp="1"/>
-          </p:cNvSpPr>
-          <p:nvPr>
-            <p:ph type="title"/>
-          </p:nvPr>
-        </p:nvSpPr>
-        <p:spPr/>
-        <p:txBody>
-          <a:bodyPr/>
-          <a:lstStyle/>
-          <a:p>
-            <a:r>
-              <a:rPr lang="es-ES" b="1" dirty="0"/>
-              <a:t>Entrenamiento de un Modelo de Regresión Logística con </a:t>
-            </a:r>
-            <a:r>
-              <a:rPr lang="es-ES" b="1" dirty="0" err="1"/>
-              <a:t>MLflow</a:t>
-            </a:r>
-            <a:endParaRPr lang="es-CO" b="1" dirty="0"/>
-          </a:p>
-        </p:txBody>
-      </p:sp>
-      <p:pic>
-        <p:nvPicPr>
-          <p:cNvPr id="7170" name="Picture 2" descr="Modelo de regresión de entrenamiento mediante ML automatizado (SDK v1) -  Azure Machine Learning | Microsoft Learn">
-            <a:extLst>
-              <a:ext uri="{FF2B5EF4-FFF2-40B4-BE49-F238E27FC236}">
-                <a16:creationId xmlns:a16="http://schemas.microsoft.com/office/drawing/2014/main" id="{7D465052-2D29-9295-49CC-5DB99285C6DD}"/>
-              </a:ext>
-            </a:extLst>
-          </p:cNvPr>
-          <p:cNvPicPr>
-            <a:picLocks noChangeAspect="1" noChangeArrowheads="1"/>
-          </p:cNvPicPr>
-          <p:nvPr/>
-        </p:nvPicPr>
-        <p:blipFill>
-          <a:blip r:embed="rId2">
-            <a:extLst>
-              <a:ext uri="{28A0092B-C50C-407E-A947-70E740481C1C}">
-                <a14:useLocalDpi xmlns:a14="http://schemas.microsoft.com/office/drawing/2010/main" val="0"/>
-              </a:ext>
-            </a:extLst>
-          </a:blip>
-          <a:srcRect/>
-          <a:stretch>
-            <a:fillRect/>
-          </a:stretch>
-        </p:blipFill>
-        <p:spPr bwMode="auto">
-          <a:xfrm>
-            <a:off x="1045460" y="2309812"/>
-            <a:ext cx="7860416" cy="3938588"/>
-          </a:xfrm>
-          <a:prstGeom prst="rect">
-            <a:avLst/>
-          </a:prstGeom>
-          <a:noFill/>
-          <a:extLst>
-            <a:ext uri="{909E8E84-426E-40DD-AFC4-6F175D3DCCD1}">
-              <a14:hiddenFill xmlns:a14="http://schemas.microsoft.com/office/drawing/2010/main">
-                <a:solidFill>
-                  <a:srgbClr val="FFFFFF"/>
-                </a:solidFill>
-              </a14:hiddenFill>
-            </a:ext>
-          </a:extLst>
-        </p:spPr>
-      </p:pic>
-    </p:spTree>
-    <p:extLst>
-      <p:ext uri="{BB962C8B-B14F-4D97-AF65-F5344CB8AC3E}">
-        <p14:creationId xmlns:p14="http://schemas.microsoft.com/office/powerpoint/2010/main" val="3625752087"/>
-      </p:ext>
-    </p:extLst>
-  </p:cSld>
-  <p:clrMapOvr>
-    <a:masterClrMapping/>
-  </p:clrMapOvr>
-</p:sld>
-</file>
-
-<file path=ppt/slides/slide14.xml><?xml version="1.0" encoding="utf-8"?>
-<p:sld xmlns:a="http://schemas.openxmlformats.org/drawingml/2006/main" xmlns:r="http://schemas.openxmlformats.org/officeDocument/2006/relationships" xmlns:p="http://schemas.openxmlformats.org/presentationml/2006/main">
-  <p:cSld>
-    <p:spTree>
-      <p:nvGrpSpPr>
-        <p:cNvPr id="1" name=""/>
-        <p:cNvGrpSpPr/>
-        <p:nvPr/>
-      </p:nvGrpSpPr>
-      <p:grpSpPr>
-        <a:xfrm>
-          <a:off x="0" y="0"/>
-          <a:ext cx="0" cy="0"/>
-          <a:chOff x="0" y="0"/>
-          <a:chExt cx="0" cy="0"/>
-        </a:xfrm>
-      </p:grpSpPr>
-      <p:sp>
-        <p:nvSpPr>
-          <p:cNvPr id="2" name="Título 1">
-            <a:extLst>
-              <a:ext uri="{FF2B5EF4-FFF2-40B4-BE49-F238E27FC236}">
-                <a16:creationId xmlns:a16="http://schemas.microsoft.com/office/drawing/2014/main" id="{5DF17863-60E5-B3E7-A5DE-2F5FDAF7AFCE}"/>
-              </a:ext>
-            </a:extLst>
-          </p:cNvPr>
-          <p:cNvSpPr>
-            <a:spLocks noGrp="1"/>
-          </p:cNvSpPr>
-          <p:nvPr>
-            <p:ph type="title"/>
-          </p:nvPr>
-        </p:nvSpPr>
-        <p:spPr/>
-        <p:txBody>
-          <a:bodyPr/>
-          <a:lstStyle/>
-          <a:p>
-            <a:r>
-              <a:rPr lang="es-ES" b="1" dirty="0"/>
-              <a:t>Creación de </a:t>
-            </a:r>
-            <a:r>
-              <a:rPr lang="es-ES" b="1" dirty="0" err="1"/>
-              <a:t>Scorecard</a:t>
-            </a:r>
-            <a:r>
-              <a:rPr lang="es-ES" b="1" dirty="0"/>
-              <a:t> con </a:t>
-            </a:r>
-            <a:r>
-              <a:rPr lang="es-ES" b="1" dirty="0" err="1"/>
-              <a:t>scorecardpy</a:t>
-            </a:r>
-            <a:endParaRPr lang="es-CO" b="1" dirty="0"/>
-          </a:p>
-        </p:txBody>
-      </p:sp>
-      <p:pic>
-        <p:nvPicPr>
-          <p:cNvPr id="8194" name="Picture 2" descr="How to use Scorecard Library in Python for Credit Risk Modeling | Tutorial  video | scorecardpy - YouTube">
-            <a:extLst>
-              <a:ext uri="{FF2B5EF4-FFF2-40B4-BE49-F238E27FC236}">
-                <a16:creationId xmlns:a16="http://schemas.microsoft.com/office/drawing/2014/main" id="{0EC75300-6E35-0BAD-B9E4-39B29675787D}"/>
-              </a:ext>
-            </a:extLst>
-          </p:cNvPr>
-          <p:cNvPicPr>
-            <a:picLocks noChangeAspect="1" noChangeArrowheads="1"/>
-          </p:cNvPicPr>
-          <p:nvPr/>
-        </p:nvPicPr>
-        <p:blipFill rotWithShape="1">
-          <a:blip r:embed="rId2">
-            <a:extLst>
-              <a:ext uri="{28A0092B-C50C-407E-A947-70E740481C1C}">
-                <a14:useLocalDpi xmlns:a14="http://schemas.microsoft.com/office/drawing/2010/main" val="0"/>
-              </a:ext>
-            </a:extLst>
-          </a:blip>
-          <a:srcRect t="14720" b="4758"/>
-          <a:stretch/>
-        </p:blipFill>
-        <p:spPr bwMode="auto">
-          <a:xfrm>
-            <a:off x="2298066" y="3920152"/>
-            <a:ext cx="5355203" cy="2426328"/>
-          </a:xfrm>
-          <a:prstGeom prst="rect">
-            <a:avLst/>
-          </a:prstGeom>
-          <a:noFill/>
-          <a:extLst>
-            <a:ext uri="{909E8E84-426E-40DD-AFC4-6F175D3DCCD1}">
-              <a14:hiddenFill xmlns:a14="http://schemas.microsoft.com/office/drawing/2010/main">
-                <a:solidFill>
-                  <a:srgbClr val="FFFFFF"/>
-                </a:solidFill>
-              </a14:hiddenFill>
-            </a:ext>
-          </a:extLst>
-        </p:spPr>
-      </p:pic>
-      <p:sp>
-        <p:nvSpPr>
-          <p:cNvPr id="6" name="Marcador de contenido 2">
-            <a:extLst>
-              <a:ext uri="{FF2B5EF4-FFF2-40B4-BE49-F238E27FC236}">
-                <a16:creationId xmlns:a16="http://schemas.microsoft.com/office/drawing/2014/main" id="{876ABFE5-98F5-FBE1-EE0D-8A720A5680C6}"/>
-              </a:ext>
-            </a:extLst>
-          </p:cNvPr>
-          <p:cNvSpPr>
-            <a:spLocks noGrp="1"/>
-          </p:cNvSpPr>
-          <p:nvPr>
-            <p:ph idx="1"/>
-          </p:nvPr>
-        </p:nvSpPr>
-        <p:spPr>
-          <a:xfrm>
-            <a:off x="677334" y="2160589"/>
-            <a:ext cx="8596668" cy="3880773"/>
-          </a:xfrm>
-        </p:spPr>
-        <p:txBody>
-          <a:bodyPr>
-            <a:normAutofit/>
-          </a:bodyPr>
-          <a:lstStyle/>
-          <a:p>
-            <a:pPr algn="just"/>
-            <a:r>
-              <a:rPr lang="es-ES" sz="2200" dirty="0"/>
-              <a:t>Código en Python.</a:t>
-            </a:r>
-          </a:p>
-          <a:p>
-            <a:pPr algn="just"/>
-            <a:r>
-              <a:rPr lang="es-ES" sz="2200" dirty="0"/>
-              <a:t>Cálculo de Puntajes con </a:t>
-            </a:r>
-            <a:r>
-              <a:rPr lang="es-ES" sz="2200" dirty="0" err="1"/>
-              <a:t>Scorecard</a:t>
-            </a:r>
-            <a:r>
-              <a:rPr lang="es-ES" sz="2200" dirty="0"/>
-              <a:t> en </a:t>
-            </a:r>
-            <a:r>
-              <a:rPr lang="es-ES" sz="2200" dirty="0" err="1"/>
-              <a:t>scorecardpy</a:t>
-            </a:r>
-            <a:r>
-              <a:rPr lang="es-ES" sz="2200" dirty="0"/>
-              <a:t>.</a:t>
-            </a:r>
-          </a:p>
-          <a:p>
-            <a:pPr algn="just"/>
-            <a:r>
-              <a:rPr lang="es-ES" sz="2200" dirty="0"/>
-              <a:t>Evaluación del Modelo con Puntajes utilizando ROC AUC.</a:t>
-            </a:r>
-          </a:p>
-          <a:p>
-            <a:pPr algn="just"/>
-            <a:r>
-              <a:rPr lang="es-CO" sz="2200" dirty="0"/>
-              <a:t>Guardar un Objeto </a:t>
-            </a:r>
-            <a:r>
-              <a:rPr lang="es-CO" sz="2200" dirty="0" err="1"/>
-              <a:t>Scorecard</a:t>
-            </a:r>
-            <a:r>
-              <a:rPr lang="es-CO" sz="2200" dirty="0"/>
-              <a:t> en un Archivo usando </a:t>
-            </a:r>
-            <a:r>
-              <a:rPr lang="es-CO" sz="2200" dirty="0" err="1"/>
-              <a:t>Pickle</a:t>
-            </a:r>
-            <a:r>
-              <a:rPr lang="es-ES" sz="2200" dirty="0"/>
-              <a:t>.</a:t>
-            </a:r>
-            <a:endParaRPr lang="es-CO" sz="2200" dirty="0"/>
-          </a:p>
-        </p:txBody>
-      </p:sp>
-    </p:spTree>
-    <p:extLst>
-      <p:ext uri="{BB962C8B-B14F-4D97-AF65-F5344CB8AC3E}">
-        <p14:creationId xmlns:p14="http://schemas.microsoft.com/office/powerpoint/2010/main" val="1235523592"/>
-      </p:ext>
-    </p:extLst>
-  </p:cSld>
-  <p:clrMapOvr>
-    <a:masterClrMapping/>
-  </p:clrMapOvr>
-</p:sld>
-</file>
-
-<file path=ppt/slides/slide15.xml><?xml version="1.0" encoding="utf-8"?>
-<p:sld xmlns:a="http://schemas.openxmlformats.org/drawingml/2006/main" xmlns:r="http://schemas.openxmlformats.org/officeDocument/2006/relationships" xmlns:p="http://schemas.openxmlformats.org/presentationml/2006/main">
-  <p:cSld>
-    <p:spTree>
-      <p:nvGrpSpPr>
-        <p:cNvPr id="1" name=""/>
-        <p:cNvGrpSpPr/>
-        <p:nvPr/>
-      </p:nvGrpSpPr>
-      <p:grpSpPr>
-        <a:xfrm>
-          <a:off x="0" y="0"/>
-          <a:ext cx="0" cy="0"/>
-          <a:chOff x="0" y="0"/>
-          <a:chExt cx="0" cy="0"/>
-        </a:xfrm>
-      </p:grpSpPr>
-      <p:sp>
-        <p:nvSpPr>
-          <p:cNvPr id="2" name="Título 1">
-            <a:extLst>
-              <a:ext uri="{FF2B5EF4-FFF2-40B4-BE49-F238E27FC236}">
-                <a16:creationId xmlns:a16="http://schemas.microsoft.com/office/drawing/2014/main" id="{5DF17863-60E5-B3E7-A5DE-2F5FDAF7AFCE}"/>
-              </a:ext>
-            </a:extLst>
-          </p:cNvPr>
-          <p:cNvSpPr>
-            <a:spLocks noGrp="1"/>
-          </p:cNvSpPr>
-          <p:nvPr>
-            <p:ph type="title"/>
-          </p:nvPr>
-        </p:nvSpPr>
-        <p:spPr/>
-        <p:txBody>
-          <a:bodyPr/>
-          <a:lstStyle/>
-          <a:p>
-            <a:r>
-              <a:rPr lang="es-ES" b="1" dirty="0"/>
               <a:t>Creación de aplicación </a:t>
             </a:r>
             <a:r>
@@ -6873,8 +6138,8 @@
         </p:blipFill>
         <p:spPr>
           <a:xfrm>
-            <a:off x="5432841" y="2965551"/>
-            <a:ext cx="4166455" cy="2270848"/>
+            <a:off x="1693854" y="1449787"/>
+            <a:ext cx="7970651" cy="4344253"/>
           </a:xfrm>
           <a:prstGeom prst="rect">
             <a:avLst/>
@@ -6883,79 +6148,42 @@
       </p:pic>
       <p:sp>
         <p:nvSpPr>
-          <p:cNvPr id="8" name="Marcador de contenido 2">
+          <p:cNvPr id="6" name="CuadroTexto 5">
             <a:extLst>
               <a:ext uri="{FF2B5EF4-FFF2-40B4-BE49-F238E27FC236}">
-                <a16:creationId xmlns:a16="http://schemas.microsoft.com/office/drawing/2014/main" id="{5A90F458-C283-4015-C1BC-7101D63F38AD}"/>
+                <a16:creationId xmlns:a16="http://schemas.microsoft.com/office/drawing/2014/main" id="{60306D93-780D-BCBE-4E3A-614CDA978EBD}"/>
               </a:ext>
             </a:extLst>
           </p:cNvPr>
-          <p:cNvSpPr>
-            <a:spLocks noGrp="1"/>
-          </p:cNvSpPr>
-          <p:nvPr>
-            <p:ph idx="1"/>
-          </p:nvPr>
+          <p:cNvSpPr txBox="1"/>
+          <p:nvPr/>
         </p:nvSpPr>
         <p:spPr>
           <a:xfrm>
-            <a:off x="677334" y="2160589"/>
-            <a:ext cx="8596668" cy="3880773"/>
+            <a:off x="1721990" y="6063734"/>
+            <a:ext cx="6105378" cy="646331"/>
           </a:xfrm>
+          <a:prstGeom prst="rect">
+            <a:avLst/>
+          </a:prstGeom>
+          <a:noFill/>
         </p:spPr>
         <p:txBody>
-          <a:bodyPr>
-            <a:normAutofit/>
+          <a:bodyPr wrap="square">
+            <a:spAutoFit/>
           </a:bodyPr>
           <a:lstStyle/>
           <a:p>
-            <a:pPr algn="just"/>
-            <a:r>
-              <a:rPr lang="es-ES" sz="2200" dirty="0"/>
-              <a:t>Importaciones y Configuración.</a:t>
-            </a:r>
-          </a:p>
-          <a:p>
-            <a:pPr algn="just"/>
-            <a:r>
-              <a:rPr lang="es-ES" sz="2200" dirty="0"/>
-              <a:t>Carga del Modelo.</a:t>
-            </a:r>
-          </a:p>
-          <a:p>
-            <a:pPr algn="just"/>
-            <a:r>
-              <a:rPr lang="es-ES" sz="2200" dirty="0"/>
-              <a:t>Recolección de Datos del Usuario.</a:t>
-            </a:r>
-          </a:p>
-          <a:p>
-            <a:pPr algn="just"/>
-            <a:r>
-              <a:rPr lang="es-CO" sz="2200" dirty="0"/>
-              <a:t>Preprocesamiento de Datos.</a:t>
-            </a:r>
-          </a:p>
-          <a:p>
-            <a:pPr algn="just"/>
-            <a:r>
-              <a:rPr lang="es-CO" sz="2200" dirty="0"/>
-              <a:t>Cálculo de la Puntuación.</a:t>
-            </a:r>
-          </a:p>
-          <a:p>
-            <a:pPr algn="just"/>
-            <a:r>
-              <a:rPr lang="es-CO" sz="2200" dirty="0"/>
-              <a:t>Visualización de la Puntuación.</a:t>
-            </a:r>
-          </a:p>
-          <a:p>
-            <a:pPr algn="just"/>
-            <a:r>
-              <a:rPr lang="es-CO" sz="2200" dirty="0"/>
-              <a:t>Actualizaciones en Tiempo Real.</a:t>
-            </a:r>
+            <a:r>
+              <a:rPr lang="es-EC" dirty="0">
+                <a:hlinkClick r:id="rId3"/>
+              </a:rPr>
+              <a:t>https://riskanalyzers.streamlit.app/</a:t>
+            </a:r>
+            <a:endParaRPr lang="es-EC" dirty="0"/>
+          </a:p>
+          <a:p>
+            <a:endParaRPr lang="es-EC" dirty="0"/>
           </a:p>
         </p:txBody>
       </p:sp>
@@ -6972,7 +6200,7 @@
 </p:sld>
 </file>
 
-<file path=ppt/slides/slide16.xml><?xml version="1.0" encoding="utf-8"?>
+<file path=ppt/slides/slide11.xml><?xml version="1.0" encoding="utf-8"?>
 <p:sld xmlns:a="http://schemas.openxmlformats.org/drawingml/2006/main" xmlns:r="http://schemas.openxmlformats.org/officeDocument/2006/relationships" xmlns:p="http://schemas.openxmlformats.org/presentationml/2006/main">
   <p:cSld>
     <p:spTree>
@@ -7288,7 +6516,7 @@
             </a:r>
             <a:r>
               <a:rPr lang="es-CO" sz="2200" dirty="0" err="1"/>
-              <a:t>Kaggel</a:t>
+              <a:t>Kaggle</a:t>
             </a:r>
             <a:r>
               <a:rPr lang="es-CO" sz="2200" dirty="0"/>
@@ -7388,7 +6616,7 @@
           <a:p>
             <a:r>
               <a:rPr lang="es-ES" b="1" dirty="0"/>
-              <a:t>Exploración y Análisis de los Datos</a:t>
+              <a:t>Preprocesamiento de Datos</a:t>
             </a:r>
             <a:endParaRPr lang="es-CO" b="1" dirty="0"/>
           </a:p>
@@ -7420,148 +6648,6 @@
             <a:pPr algn="just"/>
             <a:r>
               <a:rPr lang="es-ES" sz="2200" dirty="0"/>
-              <a:t>Realizamos una exploración inicial de los datos para entender mejor su estructura y contenido. Esto incluye análisis descriptivos y visualización de datos.</a:t>
-            </a:r>
-            <a:endParaRPr lang="es-CO" sz="2200" dirty="0"/>
-          </a:p>
-          <a:p>
-            <a:pPr algn="just"/>
-            <a:endParaRPr lang="es-CO" sz="2200" dirty="0"/>
-          </a:p>
-        </p:txBody>
-      </p:sp>
-      <p:pic>
-        <p:nvPicPr>
-          <p:cNvPr id="2050" name="Picture 2" descr="Qué es Análisis Exploratorio de Datos? | Descubre su importancia - ESEID">
-            <a:extLst>
-              <a:ext uri="{FF2B5EF4-FFF2-40B4-BE49-F238E27FC236}">
-                <a16:creationId xmlns:a16="http://schemas.microsoft.com/office/drawing/2014/main" id="{27C12296-DE21-175F-699B-59B376E7AAA4}"/>
-              </a:ext>
-            </a:extLst>
-          </p:cNvPr>
-          <p:cNvPicPr>
-            <a:picLocks noChangeAspect="1" noChangeArrowheads="1"/>
-          </p:cNvPicPr>
-          <p:nvPr/>
-        </p:nvPicPr>
-        <p:blipFill>
-          <a:blip r:embed="rId2">
-            <a:extLst>
-              <a:ext uri="{28A0092B-C50C-407E-A947-70E740481C1C}">
-                <a14:useLocalDpi xmlns:a14="http://schemas.microsoft.com/office/drawing/2010/main" val="0"/>
-              </a:ext>
-            </a:extLst>
-          </a:blip>
-          <a:srcRect/>
-          <a:stretch>
-            <a:fillRect/>
-          </a:stretch>
-        </p:blipFill>
-        <p:spPr bwMode="auto">
-          <a:xfrm>
-            <a:off x="2531953" y="3429000"/>
-            <a:ext cx="4876800" cy="3048000"/>
-          </a:xfrm>
-          <a:prstGeom prst="rect">
-            <a:avLst/>
-          </a:prstGeom>
-          <a:noFill/>
-          <a:extLst>
-            <a:ext uri="{909E8E84-426E-40DD-AFC4-6F175D3DCCD1}">
-              <a14:hiddenFill xmlns:a14="http://schemas.microsoft.com/office/drawing/2010/main">
-                <a:solidFill>
-                  <a:srgbClr val="FFFFFF"/>
-                </a:solidFill>
-              </a14:hiddenFill>
-            </a:ext>
-          </a:extLst>
-        </p:spPr>
-      </p:pic>
-    </p:spTree>
-    <p:extLst>
-      <p:ext uri="{BB962C8B-B14F-4D97-AF65-F5344CB8AC3E}">
-        <p14:creationId xmlns:p14="http://schemas.microsoft.com/office/powerpoint/2010/main" val="338327133"/>
-      </p:ext>
-    </p:extLst>
-  </p:cSld>
-  <p:clrMapOvr>
-    <a:masterClrMapping/>
-  </p:clrMapOvr>
-</p:sld>
-</file>
-
-<file path=ppt/slides/slide5.xml><?xml version="1.0" encoding="utf-8"?>
-<p:sld xmlns:a="http://schemas.openxmlformats.org/drawingml/2006/main" xmlns:r="http://schemas.openxmlformats.org/officeDocument/2006/relationships" xmlns:p="http://schemas.openxmlformats.org/presentationml/2006/main">
-  <p:cSld>
-    <p:spTree>
-      <p:nvGrpSpPr>
-        <p:cNvPr id="1" name=""/>
-        <p:cNvGrpSpPr/>
-        <p:nvPr/>
-      </p:nvGrpSpPr>
-      <p:grpSpPr>
-        <a:xfrm>
-          <a:off x="0" y="0"/>
-          <a:ext cx="0" cy="0"/>
-          <a:chOff x="0" y="0"/>
-          <a:chExt cx="0" cy="0"/>
-        </a:xfrm>
-      </p:grpSpPr>
-      <p:sp>
-        <p:nvSpPr>
-          <p:cNvPr id="2" name="Título 1">
-            <a:extLst>
-              <a:ext uri="{FF2B5EF4-FFF2-40B4-BE49-F238E27FC236}">
-                <a16:creationId xmlns:a16="http://schemas.microsoft.com/office/drawing/2014/main" id="{5DF17863-60E5-B3E7-A5DE-2F5FDAF7AFCE}"/>
-              </a:ext>
-            </a:extLst>
-          </p:cNvPr>
-          <p:cNvSpPr>
-            <a:spLocks noGrp="1"/>
-          </p:cNvSpPr>
-          <p:nvPr>
-            <p:ph type="title"/>
-          </p:nvPr>
-        </p:nvSpPr>
-        <p:spPr/>
-        <p:txBody>
-          <a:bodyPr/>
-          <a:lstStyle/>
-          <a:p>
-            <a:r>
-              <a:rPr lang="es-ES" b="1" dirty="0"/>
-              <a:t>Preprocesamiento de Datos</a:t>
-            </a:r>
-            <a:endParaRPr lang="es-CO" b="1" dirty="0"/>
-          </a:p>
-        </p:txBody>
-      </p:sp>
-      <p:sp>
-        <p:nvSpPr>
-          <p:cNvPr id="3" name="Marcador de contenido 2">
-            <a:extLst>
-              <a:ext uri="{FF2B5EF4-FFF2-40B4-BE49-F238E27FC236}">
-                <a16:creationId xmlns:a16="http://schemas.microsoft.com/office/drawing/2014/main" id="{5AD9F4B8-2E53-5861-48C8-A2CC06ECD4B6}"/>
-              </a:ext>
-            </a:extLst>
-          </p:cNvPr>
-          <p:cNvSpPr>
-            <a:spLocks noGrp="1"/>
-          </p:cNvSpPr>
-          <p:nvPr>
-            <p:ph idx="1"/>
-          </p:nvPr>
-        </p:nvSpPr>
-        <p:spPr/>
-        <p:txBody>
-          <a:bodyPr>
-            <a:normAutofit/>
-          </a:bodyPr>
-          <a:lstStyle/>
-          <a:p>
-            <a:pPr algn="just"/>
-            <a:r>
-              <a:rPr lang="es-ES" sz="2200" dirty="0"/>
               <a:t>Eliminación de la Columna de Identificación.</a:t>
             </a:r>
           </a:p>
@@ -7582,6 +6668,18 @@
               <a:rPr lang="es-ES" sz="2200" dirty="0"/>
               <a:t>.</a:t>
             </a:r>
+          </a:p>
+          <a:p>
+            <a:pPr algn="just"/>
+            <a:r>
+              <a:rPr lang="es-ES" sz="2200" dirty="0"/>
+              <a:t>Transformación de variables </a:t>
+            </a:r>
+            <a:r>
+              <a:rPr lang="es-ES" sz="2200" dirty="0" err="1"/>
+              <a:t>woe</a:t>
+            </a:r>
+            <a:endParaRPr lang="es-ES" sz="2200" dirty="0"/>
           </a:p>
           <a:p>
             <a:pPr algn="just"/>
@@ -7649,6 +6747,131 @@
 </p:sld>
 </file>
 
+<file path=ppt/slides/slide5.xml><?xml version="1.0" encoding="utf-8"?>
+<p:sld xmlns:a="http://schemas.openxmlformats.org/drawingml/2006/main" xmlns:r="http://schemas.openxmlformats.org/officeDocument/2006/relationships" xmlns:p="http://schemas.openxmlformats.org/presentationml/2006/main">
+  <p:cSld>
+    <p:spTree>
+      <p:nvGrpSpPr>
+        <p:cNvPr id="1" name=""/>
+        <p:cNvGrpSpPr/>
+        <p:nvPr/>
+      </p:nvGrpSpPr>
+      <p:grpSpPr>
+        <a:xfrm>
+          <a:off x="0" y="0"/>
+          <a:ext cx="0" cy="0"/>
+          <a:chOff x="0" y="0"/>
+          <a:chExt cx="0" cy="0"/>
+        </a:xfrm>
+      </p:grpSpPr>
+      <p:sp>
+        <p:nvSpPr>
+          <p:cNvPr id="2" name="Título 1">
+            <a:extLst>
+              <a:ext uri="{FF2B5EF4-FFF2-40B4-BE49-F238E27FC236}">
+                <a16:creationId xmlns:a16="http://schemas.microsoft.com/office/drawing/2014/main" id="{5DF17863-60E5-B3E7-A5DE-2F5FDAF7AFCE}"/>
+              </a:ext>
+            </a:extLst>
+          </p:cNvPr>
+          <p:cNvSpPr>
+            <a:spLocks noGrp="1"/>
+          </p:cNvSpPr>
+          <p:nvPr>
+            <p:ph type="title"/>
+          </p:nvPr>
+        </p:nvSpPr>
+        <p:spPr/>
+        <p:txBody>
+          <a:bodyPr/>
+          <a:lstStyle/>
+          <a:p>
+            <a:r>
+              <a:rPr lang="es-ES" b="1" dirty="0"/>
+              <a:t>Exploración y Análisis de los Datos</a:t>
+            </a:r>
+            <a:endParaRPr lang="es-CO" b="1" dirty="0"/>
+          </a:p>
+        </p:txBody>
+      </p:sp>
+      <p:sp>
+        <p:nvSpPr>
+          <p:cNvPr id="3" name="Marcador de contenido 2">
+            <a:extLst>
+              <a:ext uri="{FF2B5EF4-FFF2-40B4-BE49-F238E27FC236}">
+                <a16:creationId xmlns:a16="http://schemas.microsoft.com/office/drawing/2014/main" id="{5AD9F4B8-2E53-5861-48C8-A2CC06ECD4B6}"/>
+              </a:ext>
+            </a:extLst>
+          </p:cNvPr>
+          <p:cNvSpPr>
+            <a:spLocks noGrp="1"/>
+          </p:cNvSpPr>
+          <p:nvPr>
+            <p:ph idx="1"/>
+          </p:nvPr>
+        </p:nvSpPr>
+        <p:spPr/>
+        <p:txBody>
+          <a:bodyPr>
+            <a:normAutofit/>
+          </a:bodyPr>
+          <a:lstStyle/>
+          <a:p>
+            <a:pPr algn="just"/>
+            <a:r>
+              <a:rPr lang="es-ES" sz="2200" dirty="0"/>
+              <a:t>Realizamos una exploración inicial de los datos para entender mejor su estructura y contenido. Esto incluye análisis descriptivos y visualización de datos.</a:t>
+            </a:r>
+            <a:endParaRPr lang="es-CO" sz="2200" dirty="0"/>
+          </a:p>
+          <a:p>
+            <a:pPr algn="just"/>
+            <a:endParaRPr lang="es-CO" sz="2200" dirty="0"/>
+          </a:p>
+        </p:txBody>
+      </p:sp>
+      <p:pic>
+        <p:nvPicPr>
+          <p:cNvPr id="5" name="Imagen 4">
+            <a:extLst>
+              <a:ext uri="{FF2B5EF4-FFF2-40B4-BE49-F238E27FC236}">
+                <a16:creationId xmlns:a16="http://schemas.microsoft.com/office/drawing/2014/main" id="{A227750F-84A0-2012-3067-EFACD3249844}"/>
+              </a:ext>
+            </a:extLst>
+          </p:cNvPr>
+          <p:cNvPicPr>
+            <a:picLocks noChangeAspect="1"/>
+          </p:cNvPicPr>
+          <p:nvPr/>
+        </p:nvPicPr>
+        <p:blipFill>
+          <a:blip r:embed="rId2"/>
+          <a:stretch>
+            <a:fillRect/>
+          </a:stretch>
+        </p:blipFill>
+        <p:spPr>
+          <a:xfrm>
+            <a:off x="3319976" y="3303619"/>
+            <a:ext cx="5034695" cy="3554381"/>
+          </a:xfrm>
+          <a:prstGeom prst="rect">
+            <a:avLst/>
+          </a:prstGeom>
+        </p:spPr>
+      </p:pic>
+    </p:spTree>
+    <p:extLst>
+      <p:ext uri="{BB962C8B-B14F-4D97-AF65-F5344CB8AC3E}">
+        <p14:creationId xmlns:p14="http://schemas.microsoft.com/office/powerpoint/2010/main" val="338327133"/>
+      </p:ext>
+    </p:extLst>
+  </p:cSld>
+  <p:clrMapOvr>
+    <a:masterClrMapping/>
+  </p:clrMapOvr>
+</p:sld>
+</file>
+
 <file path=ppt/slides/slide6.xml><?xml version="1.0" encoding="utf-8"?>
 <p:sld xmlns:a="http://schemas.openxmlformats.org/drawingml/2006/main" xmlns:r="http://schemas.openxmlformats.org/officeDocument/2006/relationships" xmlns:p="http://schemas.openxmlformats.org/presentationml/2006/main">
   <p:cSld>
@@ -7689,23 +6912,7 @@
           <a:p>
             <a:r>
               <a:rPr lang="es-ES" b="1" dirty="0"/>
-              <a:t>Cálculo del </a:t>
-            </a:r>
-            <a:r>
-              <a:rPr lang="es-ES" b="1" dirty="0" err="1"/>
-              <a:t>Information</a:t>
-            </a:r>
-            <a:r>
-              <a:rPr lang="es-ES" b="1" dirty="0"/>
-              <a:t> </a:t>
-            </a:r>
-            <a:r>
-              <a:rPr lang="es-ES" b="1" dirty="0" err="1"/>
-              <a:t>Value</a:t>
-            </a:r>
-            <a:r>
-              <a:rPr lang="es-ES" b="1" dirty="0"/>
-              <a:t> (IV)</a:t>
+              <a:t>División de los Datos en Entrenamiento y Prueba</a:t>
             </a:r>
             <a:endParaRPr lang="es-CO" b="1" dirty="0"/>
           </a:p>
@@ -7737,7 +6944,31 @@
             <a:pPr algn="just"/>
             <a:r>
               <a:rPr lang="es-ES" sz="2200" dirty="0"/>
-              <a:t>Es una medida utilizada en la selección de características para modelos de riesgo crediticio. Indica la capacidad predictiva de una variable independiente con respecto a la variable dependiente (en este caso, la variable default). Un IV más alto sugiere una mayor predictividad.</a:t>
+              <a:t>Después de transformar las variables utilizando </a:t>
+            </a:r>
+            <a:r>
+              <a:rPr lang="es-ES" sz="2200" dirty="0" err="1"/>
+              <a:t>Weight</a:t>
+            </a:r>
+            <a:r>
+              <a:rPr lang="es-ES" sz="2200" dirty="0"/>
+              <a:t> </a:t>
+            </a:r>
+            <a:r>
+              <a:rPr lang="es-ES" sz="2200" dirty="0" err="1"/>
+              <a:t>of</a:t>
+            </a:r>
+            <a:r>
+              <a:rPr lang="es-ES" sz="2200" dirty="0"/>
+              <a:t> </a:t>
+            </a:r>
+            <a:r>
+              <a:rPr lang="es-ES" sz="2200" dirty="0" err="1"/>
+              <a:t>Evidence</a:t>
+            </a:r>
+            <a:r>
+              <a:rPr lang="es-ES" sz="2200" dirty="0"/>
+              <a:t> (WOE), procedemos a dividir los datos en conjuntos de entrenamiento y prueba. Esto nos permitirá entrenar nuestro modelo en el conjunto de entrenamiento y evaluar su rendimiento en el conjunto de prueba.</a:t>
             </a:r>
             <a:endParaRPr lang="es-CO" sz="2200" dirty="0"/>
           </a:p>
@@ -7745,10 +6976,10 @@
       </p:sp>
       <p:pic>
         <p:nvPicPr>
-          <p:cNvPr id="4098" name="Picture 2" descr="The Value of Information | Eternal Sunshine of the IS Mind">
+          <p:cNvPr id="5122" name="Picture 2" descr="Qué es el escenario de entrenamiento, validación y prueba de conjuntos de  datos en aprendizaje automático? - Quora">
             <a:extLst>
               <a:ext uri="{FF2B5EF4-FFF2-40B4-BE49-F238E27FC236}">
-                <a16:creationId xmlns:a16="http://schemas.microsoft.com/office/drawing/2014/main" id="{15857AD7-C9D8-4659-E4FD-E196D325BB05}"/>
+                <a16:creationId xmlns:a16="http://schemas.microsoft.com/office/drawing/2014/main" id="{911D76D3-7560-600A-119A-3B5FA23500E1}"/>
               </a:ext>
             </a:extLst>
           </p:cNvPr>
@@ -7772,8 +7003,8 @@
         </p:blipFill>
         <p:spPr bwMode="auto">
           <a:xfrm>
-            <a:off x="2724231" y="4100975"/>
-            <a:ext cx="4502873" cy="2578018"/>
+            <a:off x="2284855" y="4211087"/>
+            <a:ext cx="5381625" cy="2419350"/>
           </a:xfrm>
           <a:prstGeom prst="rect">
             <a:avLst/>
@@ -7793,7 +7024,7 @@
     </p:spTree>
     <p:extLst>
       <p:ext uri="{BB962C8B-B14F-4D97-AF65-F5344CB8AC3E}">
-        <p14:creationId xmlns:p14="http://schemas.microsoft.com/office/powerpoint/2010/main" val="2656826276"/>
+        <p14:creationId xmlns:p14="http://schemas.microsoft.com/office/powerpoint/2010/main" val="3816782697"/>
       </p:ext>
     </p:extLst>
   </p:cSld>
@@ -7843,111 +7074,67 @@
           <a:p>
             <a:r>
               <a:rPr lang="es-ES" b="1" dirty="0"/>
-              <a:t>Conclusión del Análisis del </a:t>
+              <a:t>Configuración y Uso de </a:t>
             </a:r>
             <a:r>
               <a:rPr lang="es-ES" b="1" dirty="0" err="1"/>
-              <a:t>Information</a:t>
-            </a:r>
-            <a:r>
-              <a:rPr lang="es-ES" b="1" dirty="0"/>
-              <a:t> </a:t>
-            </a:r>
-            <a:r>
-              <a:rPr lang="es-ES" b="1" dirty="0" err="1"/>
-              <a:t>Value</a:t>
-            </a:r>
-            <a:r>
-              <a:rPr lang="es-ES" b="1" dirty="0"/>
-              <a:t> (IV)</a:t>
+              <a:t>MLflow</a:t>
             </a:r>
             <a:endParaRPr lang="es-CO" b="1" dirty="0"/>
           </a:p>
         </p:txBody>
       </p:sp>
-      <p:sp>
-        <p:nvSpPr>
-          <p:cNvPr id="3" name="Marcador de contenido 2">
+      <p:pic>
+        <p:nvPicPr>
+          <p:cNvPr id="6146" name="Picture 2" descr="MLflow - tutorial para gestionar tu modelo">
             <a:extLst>
               <a:ext uri="{FF2B5EF4-FFF2-40B4-BE49-F238E27FC236}">
-                <a16:creationId xmlns:a16="http://schemas.microsoft.com/office/drawing/2014/main" id="{5AD9F4B8-2E53-5861-48C8-A2CC06ECD4B6}"/>
+                <a16:creationId xmlns:a16="http://schemas.microsoft.com/office/drawing/2014/main" id="{01F0B848-5442-8BFF-33C7-1EE5138B3A00}"/>
               </a:ext>
             </a:extLst>
           </p:cNvPr>
-          <p:cNvSpPr>
-            <a:spLocks noGrp="1"/>
-          </p:cNvSpPr>
-          <p:nvPr>
-            <p:ph idx="1"/>
-          </p:nvPr>
-        </p:nvSpPr>
-        <p:spPr/>
-        <p:txBody>
-          <a:bodyPr>
-            <a:normAutofit/>
-          </a:bodyPr>
-          <a:lstStyle/>
-          <a:p>
-            <a:pPr algn="just"/>
-            <a:r>
-              <a:rPr lang="es-ES" sz="2200" dirty="0"/>
-              <a:t>La tabla de </a:t>
-            </a:r>
-            <a:r>
-              <a:rPr lang="es-ES" sz="2200" dirty="0" err="1"/>
-              <a:t>Information</a:t>
-            </a:r>
-            <a:r>
-              <a:rPr lang="es-ES" sz="2200" dirty="0"/>
-              <a:t> </a:t>
-            </a:r>
-            <a:r>
-              <a:rPr lang="es-ES" sz="2200" dirty="0" err="1"/>
-              <a:t>Value</a:t>
-            </a:r>
-            <a:r>
-              <a:rPr lang="es-ES" sz="2200" dirty="0"/>
-              <a:t> (IV) proporciona una visión clara de la capacidad predictiva de cada variable en relación con la variable objetivo (default).</a:t>
-            </a:r>
-          </a:p>
-          <a:p>
-            <a:pPr algn="just"/>
-            <a:endParaRPr lang="es-ES" sz="2200" dirty="0"/>
-          </a:p>
-          <a:p>
-            <a:pPr algn="just"/>
-            <a:r>
-              <a:rPr lang="es-ES" sz="2200" dirty="0"/>
-              <a:t>Variables Altamente Predictivas</a:t>
-            </a:r>
-          </a:p>
-          <a:p>
-            <a:pPr algn="just"/>
-            <a:r>
-              <a:rPr lang="es-CO" sz="2200" dirty="0"/>
-              <a:t>Variables Moderadamente Predictivas</a:t>
-            </a:r>
-          </a:p>
-          <a:p>
-            <a:pPr algn="just"/>
-            <a:r>
-              <a:rPr lang="es-CO" sz="2200" dirty="0"/>
-              <a:t>Variables Débilmente Predictivas</a:t>
-            </a:r>
-          </a:p>
-          <a:p>
-            <a:pPr algn="just"/>
-            <a:r>
-              <a:rPr lang="es-CO" sz="2200" dirty="0"/>
-              <a:t>Variables Poco Predictivas</a:t>
-            </a:r>
-          </a:p>
-        </p:txBody>
-      </p:sp>
+          <p:cNvPicPr>
+            <a:picLocks noChangeAspect="1" noChangeArrowheads="1"/>
+          </p:cNvPicPr>
+          <p:nvPr/>
+        </p:nvPicPr>
+        <p:blipFill>
+          <a:blip r:embed="rId2">
+            <a:extLst>
+              <a:ext uri="{28A0092B-C50C-407E-A947-70E740481C1C}">
+                <a14:useLocalDpi xmlns:a14="http://schemas.microsoft.com/office/drawing/2010/main" val="0"/>
+              </a:ext>
+            </a:extLst>
+          </a:blip>
+          <a:srcRect/>
+          <a:stretch>
+            <a:fillRect/>
+          </a:stretch>
+        </p:blipFill>
+        <p:spPr bwMode="auto">
+          <a:xfrm>
+            <a:off x="963977" y="1735247"/>
+            <a:ext cx="8023382" cy="4513153"/>
+          </a:xfrm>
+          <a:prstGeom prst="rect">
+            <a:avLst/>
+          </a:prstGeom>
+          <a:noFill/>
+          <a:extLst>
+            <a:ext uri="{909E8E84-426E-40DD-AFC4-6F175D3DCCD1}">
+              <a14:hiddenFill xmlns:a14="http://schemas.microsoft.com/office/drawing/2010/main">
+                <a:solidFill>
+                  <a:srgbClr val="FFFFFF"/>
+                </a:solidFill>
+              </a14:hiddenFill>
+            </a:ext>
+          </a:extLst>
+        </p:spPr>
+      </p:pic>
     </p:spTree>
     <p:extLst>
       <p:ext uri="{BB962C8B-B14F-4D97-AF65-F5344CB8AC3E}">
-        <p14:creationId xmlns:p14="http://schemas.microsoft.com/office/powerpoint/2010/main" val="2761887247"/>
+        <p14:creationId xmlns:p14="http://schemas.microsoft.com/office/powerpoint/2010/main" val="1979805940"/>
       </p:ext>
     </p:extLst>
   </p:cSld>
@@ -7997,64 +7184,67 @@
           <a:p>
             <a:r>
               <a:rPr lang="es-ES" b="1" dirty="0"/>
-              <a:t>Conclusión del Análisis del </a:t>
+              <a:t>Entrenamiento de un Modelo de Regresión Logística con </a:t>
             </a:r>
             <a:r>
               <a:rPr lang="es-ES" b="1" dirty="0" err="1"/>
-              <a:t>Information</a:t>
-            </a:r>
-            <a:r>
-              <a:rPr lang="es-ES" b="1" dirty="0"/>
-              <a:t> </a:t>
-            </a:r>
-            <a:r>
-              <a:rPr lang="es-ES" b="1" dirty="0" err="1"/>
-              <a:t>Value</a:t>
-            </a:r>
-            <a:r>
-              <a:rPr lang="es-ES" b="1" dirty="0"/>
-              <a:t> (IV)</a:t>
+              <a:t>MLflow</a:t>
             </a:r>
             <a:endParaRPr lang="es-CO" b="1" dirty="0"/>
           </a:p>
         </p:txBody>
       </p:sp>
-      <p:sp>
-        <p:nvSpPr>
-          <p:cNvPr id="3" name="Marcador de contenido 2">
+      <p:pic>
+        <p:nvPicPr>
+          <p:cNvPr id="7170" name="Picture 2" descr="Modelo de regresión de entrenamiento mediante ML automatizado (SDK v1) -  Azure Machine Learning | Microsoft Learn">
             <a:extLst>
               <a:ext uri="{FF2B5EF4-FFF2-40B4-BE49-F238E27FC236}">
-                <a16:creationId xmlns:a16="http://schemas.microsoft.com/office/drawing/2014/main" id="{5AD9F4B8-2E53-5861-48C8-A2CC06ECD4B6}"/>
+                <a16:creationId xmlns:a16="http://schemas.microsoft.com/office/drawing/2014/main" id="{7D465052-2D29-9295-49CC-5DB99285C6DD}"/>
               </a:ext>
             </a:extLst>
           </p:cNvPr>
-          <p:cNvSpPr>
-            <a:spLocks noGrp="1"/>
-          </p:cNvSpPr>
-          <p:nvPr>
-            <p:ph idx="1"/>
-          </p:nvPr>
-        </p:nvSpPr>
-        <p:spPr/>
-        <p:txBody>
-          <a:bodyPr>
-            <a:normAutofit/>
-          </a:bodyPr>
-          <a:lstStyle/>
-          <a:p>
-            <a:pPr algn="just"/>
-            <a:r>
-              <a:rPr lang="es-ES" sz="2200" dirty="0"/>
-              <a:t>En resumen, el análisis del IV nos ha permitido identificar las variables clave que influirán en el modelo de riesgo crediticio, facilitando la selección de características y mejorando la efectividad del modelo.</a:t>
-            </a:r>
-            <a:endParaRPr lang="es-CO" sz="2200" dirty="0"/>
-          </a:p>
-        </p:txBody>
-      </p:sp>
+          <p:cNvPicPr>
+            <a:picLocks noChangeAspect="1" noChangeArrowheads="1"/>
+          </p:cNvPicPr>
+          <p:nvPr/>
+        </p:nvPicPr>
+        <p:blipFill>
+          <a:blip r:embed="rId2">
+            <a:extLst>
+              <a:ext uri="{28A0092B-C50C-407E-A947-70E740481C1C}">
+                <a14:useLocalDpi xmlns:a14="http://schemas.microsoft.com/office/drawing/2010/main" val="0"/>
+              </a:ext>
+            </a:extLst>
+          </a:blip>
+          <a:srcRect/>
+          <a:stretch>
+            <a:fillRect/>
+          </a:stretch>
+        </p:blipFill>
+        <p:spPr bwMode="auto">
+          <a:xfrm>
+            <a:off x="1045460" y="2309812"/>
+            <a:ext cx="7860416" cy="3938588"/>
+          </a:xfrm>
+          <a:prstGeom prst="rect">
+            <a:avLst/>
+          </a:prstGeom>
+          <a:noFill/>
+          <a:extLst>
+            <a:ext uri="{909E8E84-426E-40DD-AFC4-6F175D3DCCD1}">
+              <a14:hiddenFill xmlns:a14="http://schemas.microsoft.com/office/drawing/2010/main">
+                <a:solidFill>
+                  <a:srgbClr val="FFFFFF"/>
+                </a:solidFill>
+              </a14:hiddenFill>
+            </a:ext>
+          </a:extLst>
+        </p:spPr>
+      </p:pic>
     </p:spTree>
     <p:extLst>
       <p:ext uri="{BB962C8B-B14F-4D97-AF65-F5344CB8AC3E}">
-        <p14:creationId xmlns:p14="http://schemas.microsoft.com/office/powerpoint/2010/main" val="2046449368"/>
+        <p14:creationId xmlns:p14="http://schemas.microsoft.com/office/powerpoint/2010/main" val="3625752087"/>
       </p:ext>
     </p:extLst>
   </p:cSld>
@@ -8104,134 +7294,163 @@
           <a:p>
             <a:r>
               <a:rPr lang="es-ES" b="1" dirty="0"/>
-              <a:t>Discretización y Cálculo de WOE e IV</a:t>
+              <a:t>Creación de </a:t>
+            </a:r>
+            <a:r>
+              <a:rPr lang="es-ES" b="1" dirty="0" err="1"/>
+              <a:t>Scorecard</a:t>
+            </a:r>
+            <a:r>
+              <a:rPr lang="es-ES" b="1" dirty="0"/>
+              <a:t> con </a:t>
+            </a:r>
+            <a:r>
+              <a:rPr lang="es-ES" b="1" dirty="0" err="1"/>
+              <a:t>scorecardpy</a:t>
             </a:r>
             <a:endParaRPr lang="es-CO" b="1" dirty="0"/>
           </a:p>
         </p:txBody>
       </p:sp>
-      <p:sp>
-        <p:nvSpPr>
-          <p:cNvPr id="3" name="Marcador de contenido 2">
+      <p:pic>
+        <p:nvPicPr>
+          <p:cNvPr id="8194" name="Picture 2" descr="How to use Scorecard Library in Python for Credit Risk Modeling | Tutorial  video | scorecardpy - YouTube">
             <a:extLst>
               <a:ext uri="{FF2B5EF4-FFF2-40B4-BE49-F238E27FC236}">
-                <a16:creationId xmlns:a16="http://schemas.microsoft.com/office/drawing/2014/main" id="{5AD9F4B8-2E53-5861-48C8-A2CC06ECD4B6}"/>
-              </a:ext>
-            </a:extLst>
-          </p:cNvPr>
-          <p:cNvSpPr>
-            <a:spLocks noGrp="1"/>
-          </p:cNvSpPr>
-          <p:nvPr>
-            <p:ph idx="1"/>
-          </p:nvPr>
-        </p:nvSpPr>
-        <p:spPr/>
-        <p:txBody>
-          <a:bodyPr>
-            <a:normAutofit/>
-          </a:bodyPr>
-          <a:lstStyle/>
-          <a:p>
-            <a:pPr algn="just"/>
-            <a:r>
-              <a:rPr lang="es-ES" sz="2200" dirty="0"/>
-              <a:t>Para discretizar las variables continuas y calcular </a:t>
-            </a:r>
-            <a:r>
-              <a:rPr lang="es-ES" sz="2200" dirty="0" err="1"/>
-              <a:t>Weight</a:t>
-            </a:r>
-            <a:r>
-              <a:rPr lang="es-ES" sz="2200" dirty="0"/>
-              <a:t> </a:t>
-            </a:r>
-            <a:r>
-              <a:rPr lang="es-ES" sz="2200" dirty="0" err="1"/>
-              <a:t>of</a:t>
-            </a:r>
-            <a:r>
-              <a:rPr lang="es-ES" sz="2200" dirty="0"/>
-              <a:t> </a:t>
-            </a:r>
-            <a:r>
-              <a:rPr lang="es-ES" sz="2200" dirty="0" err="1"/>
-              <a:t>Evidence</a:t>
-            </a:r>
-            <a:r>
-              <a:rPr lang="es-ES" sz="2200" dirty="0"/>
-              <a:t> (WOE) e </a:t>
-            </a:r>
-            <a:r>
-              <a:rPr lang="es-ES" sz="2200" dirty="0" err="1"/>
-              <a:t>Information</a:t>
-            </a:r>
-            <a:r>
-              <a:rPr lang="es-ES" sz="2200" dirty="0"/>
-              <a:t> </a:t>
-            </a:r>
-            <a:r>
-              <a:rPr lang="es-ES" sz="2200" dirty="0" err="1"/>
-              <a:t>Value</a:t>
-            </a:r>
-            <a:r>
-              <a:rPr lang="es-ES" sz="2200" dirty="0"/>
-              <a:t> (IV), utilizamos la función </a:t>
-            </a:r>
-            <a:r>
-              <a:rPr lang="es-ES" sz="2200" dirty="0" err="1"/>
-              <a:t>woebin</a:t>
-            </a:r>
-            <a:r>
-              <a:rPr lang="es-ES" sz="2200" dirty="0"/>
-              <a:t> de la biblioteca </a:t>
-            </a:r>
-            <a:r>
-              <a:rPr lang="es-ES" sz="2200" dirty="0" err="1"/>
-              <a:t>scorecardpy</a:t>
-            </a:r>
-            <a:r>
-              <a:rPr lang="es-ES" sz="2200" dirty="0"/>
-              <a:t>. Este proceso nos ayudará a preparar las variables para el modelado de riesgo crediticio.</a:t>
-            </a:r>
-            <a:endParaRPr lang="es-CO" sz="2200" dirty="0"/>
-          </a:p>
-        </p:txBody>
-      </p:sp>
-      <p:pic>
-        <p:nvPicPr>
-          <p:cNvPr id="5" name="Imagen 4">
-            <a:extLst>
-              <a:ext uri="{FF2B5EF4-FFF2-40B4-BE49-F238E27FC236}">
-                <a16:creationId xmlns:a16="http://schemas.microsoft.com/office/drawing/2014/main" id="{7B42E039-C413-0012-7368-4AE31A3D0128}"/>
+                <a16:creationId xmlns:a16="http://schemas.microsoft.com/office/drawing/2014/main" id="{0EC75300-6E35-0BAD-B9E4-39B29675787D}"/>
               </a:ext>
             </a:extLst>
           </p:cNvPr>
           <p:cNvPicPr>
-            <a:picLocks noChangeAspect="1"/>
+            <a:picLocks noChangeAspect="1" noChangeArrowheads="1"/>
           </p:cNvPicPr>
           <p:nvPr/>
         </p:nvPicPr>
-        <p:blipFill>
-          <a:blip r:embed="rId2"/>
-          <a:stretch>
-            <a:fillRect/>
-          </a:stretch>
+        <p:blipFill rotWithShape="1">
+          <a:blip r:embed="rId2">
+            <a:extLst>
+              <a:ext uri="{28A0092B-C50C-407E-A947-70E740481C1C}">
+                <a14:useLocalDpi xmlns:a14="http://schemas.microsoft.com/office/drawing/2010/main" val="0"/>
+              </a:ext>
+            </a:extLst>
+          </a:blip>
+          <a:srcRect t="14720" b="4758"/>
+          <a:stretch/>
         </p:blipFill>
-        <p:spPr>
+        <p:spPr bwMode="auto">
           <a:xfrm>
-            <a:off x="2975139" y="3937600"/>
-            <a:ext cx="4001058" cy="2333951"/>
+            <a:off x="2298066" y="3920152"/>
+            <a:ext cx="5355203" cy="2426328"/>
           </a:xfrm>
           <a:prstGeom prst="rect">
             <a:avLst/>
           </a:prstGeom>
+          <a:noFill/>
+          <a:extLst>
+            <a:ext uri="{909E8E84-426E-40DD-AFC4-6F175D3DCCD1}">
+              <a14:hiddenFill xmlns:a14="http://schemas.microsoft.com/office/drawing/2010/main">
+                <a:solidFill>
+                  <a:srgbClr val="FFFFFF"/>
+                </a:solidFill>
+              </a14:hiddenFill>
+            </a:ext>
+          </a:extLst>
         </p:spPr>
       </p:pic>
+      <p:sp>
+        <p:nvSpPr>
+          <p:cNvPr id="6" name="Marcador de contenido 2">
+            <a:extLst>
+              <a:ext uri="{FF2B5EF4-FFF2-40B4-BE49-F238E27FC236}">
+                <a16:creationId xmlns:a16="http://schemas.microsoft.com/office/drawing/2014/main" id="{876ABFE5-98F5-FBE1-EE0D-8A720A5680C6}"/>
+              </a:ext>
+            </a:extLst>
+          </p:cNvPr>
+          <p:cNvSpPr>
+            <a:spLocks noGrp="1"/>
+          </p:cNvSpPr>
+          <p:nvPr>
+            <p:ph idx="1"/>
+          </p:nvPr>
+        </p:nvSpPr>
+        <p:spPr>
+          <a:xfrm>
+            <a:off x="677334" y="2160589"/>
+            <a:ext cx="8596668" cy="3880773"/>
+          </a:xfrm>
+        </p:spPr>
+        <p:txBody>
+          <a:bodyPr>
+            <a:normAutofit/>
+          </a:bodyPr>
+          <a:lstStyle/>
+          <a:p>
+            <a:pPr algn="just"/>
+            <a:r>
+              <a:rPr lang="es-ES" sz="2200" dirty="0"/>
+              <a:t>Código en Python.</a:t>
+            </a:r>
+          </a:p>
+          <a:p>
+            <a:pPr algn="just"/>
+            <a:r>
+              <a:rPr lang="es-ES" sz="2200" dirty="0"/>
+              <a:t>Cálculo de Puntajes con </a:t>
+            </a:r>
+            <a:r>
+              <a:rPr lang="es-ES" sz="2200" dirty="0" err="1"/>
+              <a:t>Scorecard</a:t>
+            </a:r>
+            <a:r>
+              <a:rPr lang="es-ES" sz="2200" dirty="0"/>
+              <a:t> en </a:t>
+            </a:r>
+            <a:r>
+              <a:rPr lang="es-ES" sz="2200" dirty="0" err="1"/>
+              <a:t>scorecardpy</a:t>
+            </a:r>
+            <a:r>
+              <a:rPr lang="es-ES" sz="2200" dirty="0"/>
+              <a:t>.</a:t>
+            </a:r>
+          </a:p>
+          <a:p>
+            <a:pPr algn="just"/>
+            <a:r>
+              <a:rPr lang="es-ES" sz="2200" dirty="0"/>
+              <a:t>Evaluación del Modelo con Puntajes utilizando ROC AUC.</a:t>
+            </a:r>
+          </a:p>
+          <a:p>
+            <a:pPr algn="just"/>
+            <a:r>
+              <a:rPr lang="es-CO" sz="2200" dirty="0"/>
+              <a:t>Guardar un Objeto </a:t>
+            </a:r>
+            <a:r>
+              <a:rPr lang="es-CO" sz="2200" dirty="0" err="1"/>
+              <a:t>Scorecard</a:t>
+            </a:r>
+            <a:r>
+              <a:rPr lang="es-CO" sz="2200" dirty="0"/>
+              <a:t> en un Archivo usando </a:t>
+            </a:r>
+            <a:r>
+              <a:rPr lang="es-CO" sz="2200" dirty="0" err="1"/>
+              <a:t>Pickle</a:t>
+            </a:r>
+            <a:r>
+              <a:rPr lang="es-ES" sz="2200" dirty="0"/>
+              <a:t>.</a:t>
+            </a:r>
+            <a:endParaRPr lang="es-CO" sz="2200" dirty="0"/>
+          </a:p>
+        </p:txBody>
+      </p:sp>
     </p:spTree>
     <p:extLst>
       <p:ext uri="{BB962C8B-B14F-4D97-AF65-F5344CB8AC3E}">
-        <p14:creationId xmlns:p14="http://schemas.microsoft.com/office/powerpoint/2010/main" val="3629404119"/>
+        <p14:creationId xmlns:p14="http://schemas.microsoft.com/office/powerpoint/2010/main" val="1235523592"/>
       </p:ext>
     </p:extLst>
   </p:cSld>

</xml_diff>

<commit_message>
actulizacion de guia positiva
</commit_message>
<xml_diff>
--- a/projects/RiskAnalyzers_project/presentation/riskanalyzers_presentacion.pptx
+++ b/projects/RiskAnalyzers_project/presentation/riskanalyzers_presentacion.pptx
@@ -6679,7 +6679,10 @@
               <a:rPr lang="es-ES" sz="2200" dirty="0" err="1"/>
               <a:t>woe</a:t>
             </a:r>
-            <a:endParaRPr lang="es-ES" sz="2200" dirty="0"/>
+            <a:r>
+              <a:rPr lang="es-ES" sz="2200" dirty="0"/>
+              <a:t> </a:t>
+            </a:r>
           </a:p>
           <a:p>
             <a:pPr algn="just"/>
@@ -7388,7 +7391,7 @@
             <a:pPr algn="just"/>
             <a:r>
               <a:rPr lang="es-ES" sz="2200" dirty="0"/>
-              <a:t>Código en Python.</a:t>
+              <a:t>Evaluación del Modelo con Puntajes utilizando ROC AUC.</a:t>
             </a:r>
           </a:p>
           <a:p>
@@ -7412,13 +7415,6 @@
             <a:r>
               <a:rPr lang="es-ES" sz="2200" dirty="0"/>
               <a:t>.</a:t>
-            </a:r>
-          </a:p>
-          <a:p>
-            <a:pPr algn="just"/>
-            <a:r>
-              <a:rPr lang="es-ES" sz="2200" dirty="0"/>
-              <a:t>Evaluación del Modelo con Puntajes utilizando ROC AUC.</a:t>
             </a:r>
           </a:p>
           <a:p>

</xml_diff>